<commit_message>
Atualizações para a apresentação.
</commit_message>
<xml_diff>
--- a/Pitch_do_Projeto.pptx
+++ b/Pitch_do_Projeto.pptx
@@ -5,7 +5,7 @@
     <p:sldMasterId id="2147483671" r:id="rId1"/>
   </p:sldMasterIdLst>
   <p:notesMasterIdLst>
-    <p:notesMasterId r:id="rId14"/>
+    <p:notesMasterId r:id="rId18"/>
   </p:notesMasterIdLst>
   <p:sldIdLst>
     <p:sldId id="256" r:id="rId2"/>
@@ -17,20 +17,24 @@
     <p:sldId id="260" r:id="rId8"/>
     <p:sldId id="267" r:id="rId9"/>
     <p:sldId id="262" r:id="rId10"/>
-    <p:sldId id="263" r:id="rId11"/>
-    <p:sldId id="264" r:id="rId12"/>
-    <p:sldId id="265" r:id="rId13"/>
+    <p:sldId id="268" r:id="rId11"/>
+    <p:sldId id="269" r:id="rId12"/>
+    <p:sldId id="270" r:id="rId13"/>
+    <p:sldId id="271" r:id="rId14"/>
+    <p:sldId id="272" r:id="rId15"/>
+    <p:sldId id="264" r:id="rId16"/>
+    <p:sldId id="265" r:id="rId17"/>
   </p:sldIdLst>
   <p:sldSz cx="9144000" cy="5143500" type="screen16x9"/>
   <p:notesSz cx="6858000" cy="9144000"/>
   <p:embeddedFontLst>
     <p:embeddedFont>
       <p:font typeface="Questrial" pitchFamily="2" charset="0"/>
-      <p:regular r:id="rId15"/>
+      <p:regular r:id="rId19"/>
     </p:embeddedFont>
     <p:embeddedFont>
       <p:font typeface="Squada One" panose="020B0604020202020204" charset="0"/>
-      <p:regular r:id="rId16"/>
+      <p:regular r:id="rId20"/>
     </p:embeddedFont>
   </p:embeddedFontLst>
   <p:defaultTextStyle>
@@ -844,7 +848,7 @@
         </p:nvSpPr>
         <p:spPr>
           <a:xfrm>
-            <a:off x="381300" y="685800"/>
+            <a:off x="381000" y="685800"/>
             <a:ext cx="6096000" cy="3429000"/>
           </a:xfrm>
           <a:custGeom>
@@ -1014,7 +1018,7 @@
         </p:nvSpPr>
         <p:spPr>
           <a:xfrm>
-            <a:off x="381300" y="685800"/>
+            <a:off x="381000" y="685800"/>
             <a:ext cx="6096000" cy="3429000"/>
           </a:xfrm>
           <a:custGeom>
@@ -1146,6 +1150,72 @@
     <p:extLst>
       <p:ext uri="{BB962C8B-B14F-4D97-AF65-F5344CB8AC3E}">
         <p14:creationId xmlns:p14="http://schemas.microsoft.com/office/powerpoint/2010/main" val="383638779"/>
+      </p:ext>
+    </p:extLst>
+  </p:cSld>
+  <p:clrMapOvr>
+    <a:masterClrMapping/>
+  </p:clrMapOvr>
+</p:notes>
+</file>
+
+<file path=ppt/notesSlides/notesSlide6.xml><?xml version="1.0" encoding="utf-8"?>
+<p:notes xmlns:a="http://schemas.openxmlformats.org/drawingml/2006/main" xmlns:r="http://schemas.openxmlformats.org/officeDocument/2006/relationships" xmlns:p="http://schemas.openxmlformats.org/presentationml/2006/main">
+  <p:cSld>
+    <p:spTree>
+      <p:nvGrpSpPr>
+        <p:cNvPr id="1" name=""/>
+        <p:cNvGrpSpPr/>
+        <p:nvPr/>
+      </p:nvGrpSpPr>
+      <p:grpSpPr>
+        <a:xfrm>
+          <a:off x="0" y="0"/>
+          <a:ext cx="0" cy="0"/>
+          <a:chOff x="0" y="0"/>
+          <a:chExt cx="0" cy="0"/>
+        </a:xfrm>
+      </p:grpSpPr>
+      <p:sp>
+        <p:nvSpPr>
+          <p:cNvPr id="2" name="Espaço Reservado para Imagem de Slide 1"/>
+          <p:cNvSpPr>
+            <a:spLocks noGrp="1" noRot="1" noChangeAspect="1"/>
+          </p:cNvSpPr>
+          <p:nvPr>
+            <p:ph type="sldImg"/>
+          </p:nvPr>
+        </p:nvSpPr>
+        <p:spPr>
+          <a:xfrm>
+            <a:off x="381000" y="685800"/>
+            <a:ext cx="6096000" cy="3429000"/>
+          </a:xfrm>
+        </p:spPr>
+      </p:sp>
+      <p:sp>
+        <p:nvSpPr>
+          <p:cNvPr id="3" name="Espaço Reservado para Anotações 2"/>
+          <p:cNvSpPr>
+            <a:spLocks noGrp="1"/>
+          </p:cNvSpPr>
+          <p:nvPr>
+            <p:ph type="body" idx="1"/>
+          </p:nvPr>
+        </p:nvSpPr>
+        <p:spPr/>
+        <p:txBody>
+          <a:bodyPr/>
+          <a:lstStyle/>
+          <a:p>
+            <a:endParaRPr lang="pt-BR" dirty="0"/>
+          </a:p>
+        </p:txBody>
+      </p:sp>
+    </p:spTree>
+    <p:extLst>
+      <p:ext uri="{BB962C8B-B14F-4D97-AF65-F5344CB8AC3E}">
+        <p14:creationId xmlns:p14="http://schemas.microsoft.com/office/powerpoint/2010/main" val="3671263330"/>
       </p:ext>
     </p:extLst>
   </p:cSld>
@@ -26747,13 +26817,7 @@
   <p:cSld>
     <p:spTree>
       <p:nvGrpSpPr>
-        <p:cNvPr id="1" name="">
-          <a:extLst>
-            <a:ext uri="{FF2B5EF4-FFF2-40B4-BE49-F238E27FC236}">
-              <a16:creationId xmlns:a16="http://schemas.microsoft.com/office/drawing/2014/main" id="{03BC733B-6F64-38B9-67F2-B3A7DD2F7FB7}"/>
-            </a:ext>
-          </a:extLst>
-        </p:cNvPr>
+        <p:cNvPr id="1" name=""/>
         <p:cNvGrpSpPr/>
         <p:nvPr/>
       </p:nvGrpSpPr>
@@ -26767,10 +26831,163 @@
       </p:grpSpPr>
       <p:sp>
         <p:nvSpPr>
-          <p:cNvPr id="14" name="Título 13">
+          <p:cNvPr id="2" name="Título 1">
             <a:extLst>
               <a:ext uri="{FF2B5EF4-FFF2-40B4-BE49-F238E27FC236}">
-                <a16:creationId xmlns:a16="http://schemas.microsoft.com/office/drawing/2014/main" id="{3AF6EF3E-189D-75D2-D3D8-D92D3D16C532}"/>
+                <a16:creationId xmlns:a16="http://schemas.microsoft.com/office/drawing/2014/main" id="{69F6334C-582A-CF29-9B58-538473C9C580}"/>
+              </a:ext>
+            </a:extLst>
+          </p:cNvPr>
+          <p:cNvSpPr>
+            <a:spLocks noGrp="1"/>
+          </p:cNvSpPr>
+          <p:nvPr>
+            <p:ph type="ctrTitle"/>
+          </p:nvPr>
+        </p:nvSpPr>
+        <p:spPr>
+          <a:xfrm>
+            <a:off x="-1984950" y="2376750"/>
+            <a:ext cx="6713100" cy="390000"/>
+          </a:xfrm>
+        </p:spPr>
+        <p:txBody>
+          <a:bodyPr/>
+          <a:lstStyle/>
+          <a:p>
+            <a:r>
+              <a:rPr lang="pt-BR" dirty="0"/>
+              <a:t>Área de </a:t>
+            </a:r>
+            <a:r>
+              <a:rPr lang="pt-BR" dirty="0" err="1"/>
+              <a:t>Staging</a:t>
+            </a:r>
+            <a:endParaRPr lang="pt-BR" dirty="0"/>
+          </a:p>
+        </p:txBody>
+      </p:sp>
+      <p:sp>
+        <p:nvSpPr>
+          <p:cNvPr id="3" name="Subtítulo 2">
+            <a:extLst>
+              <a:ext uri="{FF2B5EF4-FFF2-40B4-BE49-F238E27FC236}">
+                <a16:creationId xmlns:a16="http://schemas.microsoft.com/office/drawing/2014/main" id="{261A0C6A-F628-7250-3024-1443DC5E60B7}"/>
+              </a:ext>
+            </a:extLst>
+          </p:cNvPr>
+          <p:cNvSpPr>
+            <a:spLocks noGrp="1"/>
+          </p:cNvSpPr>
+          <p:nvPr>
+            <p:ph type="subTitle" idx="1"/>
+          </p:nvPr>
+        </p:nvSpPr>
+        <p:spPr/>
+        <p:txBody>
+          <a:bodyPr/>
+          <a:lstStyle/>
+          <a:p>
+            <a:endParaRPr lang="pt-BR"/>
+          </a:p>
+        </p:txBody>
+      </p:sp>
+      <p:sp>
+        <p:nvSpPr>
+          <p:cNvPr id="4" name="Título 3">
+            <a:extLst>
+              <a:ext uri="{FF2B5EF4-FFF2-40B4-BE49-F238E27FC236}">
+                <a16:creationId xmlns:a16="http://schemas.microsoft.com/office/drawing/2014/main" id="{8F49DE6A-E0AD-AE6C-7C31-897724AD27DE}"/>
+              </a:ext>
+            </a:extLst>
+          </p:cNvPr>
+          <p:cNvSpPr>
+            <a:spLocks noGrp="1"/>
+          </p:cNvSpPr>
+          <p:nvPr>
+            <p:ph type="title" idx="2"/>
+          </p:nvPr>
+        </p:nvSpPr>
+        <p:spPr/>
+        <p:txBody>
+          <a:bodyPr/>
+          <a:lstStyle/>
+          <a:p>
+            <a:endParaRPr lang="pt-BR"/>
+          </a:p>
+        </p:txBody>
+      </p:sp>
+      <p:pic>
+        <p:nvPicPr>
+          <p:cNvPr id="6" name="Imagem 5">
+            <a:extLst>
+              <a:ext uri="{FF2B5EF4-FFF2-40B4-BE49-F238E27FC236}">
+                <a16:creationId xmlns:a16="http://schemas.microsoft.com/office/drawing/2014/main" id="{1E39E258-6BAD-B3D0-4D18-4330A2612AFB}"/>
+              </a:ext>
+            </a:extLst>
+          </p:cNvPr>
+          <p:cNvPicPr>
+            <a:picLocks noChangeAspect="1"/>
+          </p:cNvPicPr>
+          <p:nvPr/>
+        </p:nvPicPr>
+        <p:blipFill>
+          <a:blip r:embed="rId2">
+            <a:extLst>
+              <a:ext uri="{837473B0-CC2E-450A-ABE3-18F120FF3D39}">
+                <a1611:picAttrSrcUrl xmlns:a1611="http://schemas.microsoft.com/office/drawing/2016/11/main" r:id="rId3"/>
+              </a:ext>
+            </a:extLst>
+          </a:blip>
+          <a:srcRect/>
+          <a:stretch/>
+        </p:blipFill>
+        <p:spPr>
+          <a:xfrm>
+            <a:off x="4728151" y="2086749"/>
+            <a:ext cx="4415849" cy="1906024"/>
+          </a:xfrm>
+          <a:prstGeom prst="rect">
+            <a:avLst/>
+          </a:prstGeom>
+        </p:spPr>
+      </p:pic>
+    </p:spTree>
+    <p:extLst>
+      <p:ext uri="{BB962C8B-B14F-4D97-AF65-F5344CB8AC3E}">
+        <p14:creationId xmlns:p14="http://schemas.microsoft.com/office/powerpoint/2010/main" val="379347298"/>
+      </p:ext>
+    </p:extLst>
+  </p:cSld>
+  <p:clrMapOvr>
+    <a:masterClrMapping/>
+  </p:clrMapOvr>
+</p:sld>
+</file>
+
+<file path=ppt/slides/slide11.xml><?xml version="1.0" encoding="utf-8"?>
+<p:sld xmlns:a="http://schemas.openxmlformats.org/drawingml/2006/main" xmlns:r="http://schemas.openxmlformats.org/officeDocument/2006/relationships" xmlns:p="http://schemas.openxmlformats.org/presentationml/2006/main">
+  <p:cSld>
+    <p:spTree>
+      <p:nvGrpSpPr>
+        <p:cNvPr id="1" name=""/>
+        <p:cNvGrpSpPr/>
+        <p:nvPr/>
+      </p:nvGrpSpPr>
+      <p:grpSpPr>
+        <a:xfrm>
+          <a:off x="0" y="0"/>
+          <a:ext cx="0" cy="0"/>
+          <a:chOff x="0" y="0"/>
+          <a:chExt cx="0" cy="0"/>
+        </a:xfrm>
+      </p:grpSpPr>
+      <p:sp>
+        <p:nvSpPr>
+          <p:cNvPr id="2" name="Título 1">
+            <a:extLst>
+              <a:ext uri="{FF2B5EF4-FFF2-40B4-BE49-F238E27FC236}">
+                <a16:creationId xmlns:a16="http://schemas.microsoft.com/office/drawing/2014/main" id="{4D359DEA-83C1-7183-4336-97CDCF26625B}"/>
               </a:ext>
             </a:extLst>
           </p:cNvPr>
@@ -26790,12 +27007,62 @@
           </a:p>
         </p:txBody>
       </p:sp>
+      <p:sp>
+        <p:nvSpPr>
+          <p:cNvPr id="3" name="Subtítulo 2">
+            <a:extLst>
+              <a:ext uri="{FF2B5EF4-FFF2-40B4-BE49-F238E27FC236}">
+                <a16:creationId xmlns:a16="http://schemas.microsoft.com/office/drawing/2014/main" id="{82EF74EB-49D1-36B4-D713-63B3F1397AE4}"/>
+              </a:ext>
+            </a:extLst>
+          </p:cNvPr>
+          <p:cNvSpPr>
+            <a:spLocks noGrp="1"/>
+          </p:cNvSpPr>
+          <p:nvPr>
+            <p:ph type="subTitle" idx="1"/>
+          </p:nvPr>
+        </p:nvSpPr>
+        <p:spPr/>
+        <p:txBody>
+          <a:bodyPr/>
+          <a:lstStyle/>
+          <a:p>
+            <a:endParaRPr lang="pt-BR"/>
+          </a:p>
+        </p:txBody>
+      </p:sp>
+      <p:sp>
+        <p:nvSpPr>
+          <p:cNvPr id="4" name="Título 3">
+            <a:extLst>
+              <a:ext uri="{FF2B5EF4-FFF2-40B4-BE49-F238E27FC236}">
+                <a16:creationId xmlns:a16="http://schemas.microsoft.com/office/drawing/2014/main" id="{6967ADCE-153C-9C4C-00CC-006697C3AA88}"/>
+              </a:ext>
+            </a:extLst>
+          </p:cNvPr>
+          <p:cNvSpPr>
+            <a:spLocks noGrp="1"/>
+          </p:cNvSpPr>
+          <p:nvPr>
+            <p:ph type="title" idx="2"/>
+          </p:nvPr>
+        </p:nvSpPr>
+        <p:spPr/>
+        <p:txBody>
+          <a:bodyPr/>
+          <a:lstStyle/>
+          <a:p>
+            <a:endParaRPr lang="pt-BR"/>
+          </a:p>
+        </p:txBody>
+      </p:sp>
       <p:pic>
         <p:nvPicPr>
-          <p:cNvPr id="9" name="Imagem 8">
+          <p:cNvPr id="6" name="Imagem 5">
             <a:extLst>
               <a:ext uri="{FF2B5EF4-FFF2-40B4-BE49-F238E27FC236}">
-                <a16:creationId xmlns:a16="http://schemas.microsoft.com/office/drawing/2014/main" id="{79921728-8B77-7DDB-9ED2-DD63903DC63E}"/>
+                <a16:creationId xmlns:a16="http://schemas.microsoft.com/office/drawing/2014/main" id="{7DF5AFB6-DE4C-B650-4573-59304B6F129F}"/>
               </a:ext>
             </a:extLst>
           </p:cNvPr>
@@ -26806,13 +27073,297 @@
         </p:nvPicPr>
         <p:blipFill>
           <a:blip r:embed="rId2"/>
+          <a:stretch>
+            <a:fillRect/>
+          </a:stretch>
+        </p:blipFill>
+        <p:spPr>
+          <a:xfrm>
+            <a:off x="0" y="0"/>
+            <a:ext cx="9143999" cy="5143500"/>
+          </a:xfrm>
+          <a:prstGeom prst="rect">
+            <a:avLst/>
+          </a:prstGeom>
+        </p:spPr>
+      </p:pic>
+    </p:spTree>
+    <p:extLst>
+      <p:ext uri="{BB962C8B-B14F-4D97-AF65-F5344CB8AC3E}">
+        <p14:creationId xmlns:p14="http://schemas.microsoft.com/office/powerpoint/2010/main" val="2513177506"/>
+      </p:ext>
+    </p:extLst>
+  </p:cSld>
+  <p:clrMapOvr>
+    <a:masterClrMapping/>
+  </p:clrMapOvr>
+</p:sld>
+</file>
+
+<file path=ppt/slides/slide12.xml><?xml version="1.0" encoding="utf-8"?>
+<p:sld xmlns:a="http://schemas.openxmlformats.org/drawingml/2006/main" xmlns:r="http://schemas.openxmlformats.org/officeDocument/2006/relationships" xmlns:p="http://schemas.openxmlformats.org/presentationml/2006/main">
+  <p:cSld>
+    <p:spTree>
+      <p:nvGrpSpPr>
+        <p:cNvPr id="1" name=""/>
+        <p:cNvGrpSpPr/>
+        <p:nvPr/>
+      </p:nvGrpSpPr>
+      <p:grpSpPr>
+        <a:xfrm>
+          <a:off x="0" y="0"/>
+          <a:ext cx="0" cy="0"/>
+          <a:chOff x="0" y="0"/>
+          <a:chExt cx="0" cy="0"/>
+        </a:xfrm>
+      </p:grpSpPr>
+      <p:sp>
+        <p:nvSpPr>
+          <p:cNvPr id="2" name="Título 1">
+            <a:extLst>
+              <a:ext uri="{FF2B5EF4-FFF2-40B4-BE49-F238E27FC236}">
+                <a16:creationId xmlns:a16="http://schemas.microsoft.com/office/drawing/2014/main" id="{69F6334C-582A-CF29-9B58-538473C9C580}"/>
+              </a:ext>
+            </a:extLst>
+          </p:cNvPr>
+          <p:cNvSpPr>
+            <a:spLocks noGrp="1"/>
+          </p:cNvSpPr>
+          <p:nvPr>
+            <p:ph type="ctrTitle"/>
+          </p:nvPr>
+        </p:nvSpPr>
+        <p:spPr>
+          <a:xfrm>
+            <a:off x="-1984950" y="2376750"/>
+            <a:ext cx="6713100" cy="390000"/>
+          </a:xfrm>
+        </p:spPr>
+        <p:txBody>
+          <a:bodyPr/>
+          <a:lstStyle/>
+          <a:p>
+            <a:r>
+              <a:rPr lang="pt-BR" dirty="0"/>
+              <a:t>Processo extra ETL</a:t>
+            </a:r>
+          </a:p>
+        </p:txBody>
+      </p:sp>
+      <p:sp>
+        <p:nvSpPr>
+          <p:cNvPr id="3" name="Subtítulo 2">
+            <a:extLst>
+              <a:ext uri="{FF2B5EF4-FFF2-40B4-BE49-F238E27FC236}">
+                <a16:creationId xmlns:a16="http://schemas.microsoft.com/office/drawing/2014/main" id="{261A0C6A-F628-7250-3024-1443DC5E60B7}"/>
+              </a:ext>
+            </a:extLst>
+          </p:cNvPr>
+          <p:cNvSpPr>
+            <a:spLocks noGrp="1"/>
+          </p:cNvSpPr>
+          <p:nvPr>
+            <p:ph type="subTitle" idx="1"/>
+          </p:nvPr>
+        </p:nvSpPr>
+        <p:spPr/>
+        <p:txBody>
+          <a:bodyPr/>
+          <a:lstStyle/>
+          <a:p>
+            <a:endParaRPr lang="pt-BR"/>
+          </a:p>
+        </p:txBody>
+      </p:sp>
+      <p:sp>
+        <p:nvSpPr>
+          <p:cNvPr id="4" name="Título 3">
+            <a:extLst>
+              <a:ext uri="{FF2B5EF4-FFF2-40B4-BE49-F238E27FC236}">
+                <a16:creationId xmlns:a16="http://schemas.microsoft.com/office/drawing/2014/main" id="{8F49DE6A-E0AD-AE6C-7C31-897724AD27DE}"/>
+              </a:ext>
+            </a:extLst>
+          </p:cNvPr>
+          <p:cNvSpPr>
+            <a:spLocks noGrp="1"/>
+          </p:cNvSpPr>
+          <p:nvPr>
+            <p:ph type="title" idx="2"/>
+          </p:nvPr>
+        </p:nvSpPr>
+        <p:spPr/>
+        <p:txBody>
+          <a:bodyPr/>
+          <a:lstStyle/>
+          <a:p>
+            <a:endParaRPr lang="pt-BR"/>
+          </a:p>
+        </p:txBody>
+      </p:sp>
+      <p:pic>
+        <p:nvPicPr>
+          <p:cNvPr id="6" name="Imagem 5">
+            <a:extLst>
+              <a:ext uri="{FF2B5EF4-FFF2-40B4-BE49-F238E27FC236}">
+                <a16:creationId xmlns:a16="http://schemas.microsoft.com/office/drawing/2014/main" id="{1E39E258-6BAD-B3D0-4D18-4330A2612AFB}"/>
+              </a:ext>
+            </a:extLst>
+          </p:cNvPr>
+          <p:cNvPicPr>
+            <a:picLocks noChangeAspect="1"/>
+          </p:cNvPicPr>
+          <p:nvPr/>
+        </p:nvPicPr>
+        <p:blipFill>
+          <a:blip r:embed="rId2">
+            <a:extLst>
+              <a:ext uri="{837473B0-CC2E-450A-ABE3-18F120FF3D39}">
+                <a1611:picAttrSrcUrl xmlns:a1611="http://schemas.microsoft.com/office/drawing/2016/11/main" r:id="rId3"/>
+              </a:ext>
+            </a:extLst>
+          </a:blip>
           <a:srcRect/>
           <a:stretch/>
         </p:blipFill>
         <p:spPr>
           <a:xfrm>
-            <a:off x="983226" y="453326"/>
-            <a:ext cx="7177550" cy="2058192"/>
+            <a:off x="4728149" y="1595410"/>
+            <a:ext cx="4502347" cy="2888702"/>
+          </a:xfrm>
+          <a:prstGeom prst="rect">
+            <a:avLst/>
+          </a:prstGeom>
+        </p:spPr>
+      </p:pic>
+    </p:spTree>
+    <p:extLst>
+      <p:ext uri="{BB962C8B-B14F-4D97-AF65-F5344CB8AC3E}">
+        <p14:creationId xmlns:p14="http://schemas.microsoft.com/office/powerpoint/2010/main" val="2731151433"/>
+      </p:ext>
+    </p:extLst>
+  </p:cSld>
+  <p:clrMapOvr>
+    <a:masterClrMapping/>
+  </p:clrMapOvr>
+</p:sld>
+</file>
+
+<file path=ppt/slides/slide13.xml><?xml version="1.0" encoding="utf-8"?>
+<p:sld xmlns:a="http://schemas.openxmlformats.org/drawingml/2006/main" xmlns:r="http://schemas.openxmlformats.org/officeDocument/2006/relationships" xmlns:p="http://schemas.openxmlformats.org/presentationml/2006/main">
+  <p:cSld>
+    <p:spTree>
+      <p:nvGrpSpPr>
+        <p:cNvPr id="1" name=""/>
+        <p:cNvGrpSpPr/>
+        <p:nvPr/>
+      </p:nvGrpSpPr>
+      <p:grpSpPr>
+        <a:xfrm>
+          <a:off x="0" y="0"/>
+          <a:ext cx="0" cy="0"/>
+          <a:chOff x="0" y="0"/>
+          <a:chExt cx="0" cy="0"/>
+        </a:xfrm>
+      </p:grpSpPr>
+      <p:sp>
+        <p:nvSpPr>
+          <p:cNvPr id="5" name="Título 4">
+            <a:extLst>
+              <a:ext uri="{FF2B5EF4-FFF2-40B4-BE49-F238E27FC236}">
+                <a16:creationId xmlns:a16="http://schemas.microsoft.com/office/drawing/2014/main" id="{4AA5A311-9845-CDC0-4990-B94EB6B85FB1}"/>
+              </a:ext>
+            </a:extLst>
+          </p:cNvPr>
+          <p:cNvSpPr>
+            <a:spLocks noGrp="1"/>
+          </p:cNvSpPr>
+          <p:nvPr>
+            <p:ph type="ctrTitle"/>
+          </p:nvPr>
+        </p:nvSpPr>
+        <p:spPr/>
+        <p:txBody>
+          <a:bodyPr/>
+          <a:lstStyle/>
+          <a:p>
+            <a:endParaRPr lang="pt-BR"/>
+          </a:p>
+        </p:txBody>
+      </p:sp>
+      <p:sp>
+        <p:nvSpPr>
+          <p:cNvPr id="6" name="Subtítulo 5">
+            <a:extLst>
+              <a:ext uri="{FF2B5EF4-FFF2-40B4-BE49-F238E27FC236}">
+                <a16:creationId xmlns:a16="http://schemas.microsoft.com/office/drawing/2014/main" id="{A5C734E1-BAC1-5607-2310-712CA7ED8587}"/>
+              </a:ext>
+            </a:extLst>
+          </p:cNvPr>
+          <p:cNvSpPr>
+            <a:spLocks noGrp="1"/>
+          </p:cNvSpPr>
+          <p:nvPr>
+            <p:ph type="subTitle" idx="1"/>
+          </p:nvPr>
+        </p:nvSpPr>
+        <p:spPr/>
+        <p:txBody>
+          <a:bodyPr/>
+          <a:lstStyle/>
+          <a:p>
+            <a:endParaRPr lang="pt-BR"/>
+          </a:p>
+        </p:txBody>
+      </p:sp>
+      <p:sp>
+        <p:nvSpPr>
+          <p:cNvPr id="7" name="Subtítulo 6">
+            <a:extLst>
+              <a:ext uri="{FF2B5EF4-FFF2-40B4-BE49-F238E27FC236}">
+                <a16:creationId xmlns:a16="http://schemas.microsoft.com/office/drawing/2014/main" id="{D4F6EBB6-F682-ACD0-B755-DE813EA01CCB}"/>
+              </a:ext>
+            </a:extLst>
+          </p:cNvPr>
+          <p:cNvSpPr>
+            <a:spLocks noGrp="1"/>
+          </p:cNvSpPr>
+          <p:nvPr>
+            <p:ph type="subTitle" idx="2"/>
+          </p:nvPr>
+        </p:nvSpPr>
+        <p:spPr/>
+        <p:txBody>
+          <a:bodyPr/>
+          <a:lstStyle/>
+          <a:p>
+            <a:endParaRPr lang="pt-BR"/>
+          </a:p>
+        </p:txBody>
+      </p:sp>
+      <p:pic>
+        <p:nvPicPr>
+          <p:cNvPr id="9" name="Imagem 8">
+            <a:extLst>
+              <a:ext uri="{FF2B5EF4-FFF2-40B4-BE49-F238E27FC236}">
+                <a16:creationId xmlns:a16="http://schemas.microsoft.com/office/drawing/2014/main" id="{13A68B88-34E0-2B41-7961-08A527BF3A84}"/>
+              </a:ext>
+            </a:extLst>
+          </p:cNvPr>
+          <p:cNvPicPr>
+            <a:picLocks noChangeAspect="1"/>
+          </p:cNvPicPr>
+          <p:nvPr/>
+        </p:nvPicPr>
+        <p:blipFill>
+          <a:blip r:embed="rId2"/>
+          <a:stretch>
+            <a:fillRect/>
+          </a:stretch>
+        </p:blipFill>
+        <p:spPr>
+          <a:xfrm>
+            <a:off x="70809" y="513911"/>
+            <a:ext cx="9144000" cy="1274618"/>
           </a:xfrm>
           <a:prstGeom prst="rect">
             <a:avLst/>
@@ -26821,10 +27372,10 @@
       </p:pic>
       <p:pic>
         <p:nvPicPr>
-          <p:cNvPr id="3" name="Imagem 2">
+          <p:cNvPr id="11" name="Imagem 10">
             <a:extLst>
               <a:ext uri="{FF2B5EF4-FFF2-40B4-BE49-F238E27FC236}">
-                <a16:creationId xmlns:a16="http://schemas.microsoft.com/office/drawing/2014/main" id="{BD1E8A44-41CF-67E4-6657-97EF71BB8A51}"/>
+                <a16:creationId xmlns:a16="http://schemas.microsoft.com/office/drawing/2014/main" id="{3E85E2FC-A943-6858-A45E-73B10CD65F05}"/>
               </a:ext>
             </a:extLst>
           </p:cNvPr>
@@ -26835,13 +27386,14 @@
         </p:nvPicPr>
         <p:blipFill>
           <a:blip r:embed="rId3"/>
-          <a:srcRect/>
-          <a:stretch/>
+          <a:stretch>
+            <a:fillRect/>
+          </a:stretch>
         </p:blipFill>
         <p:spPr>
           <a:xfrm>
-            <a:off x="1527586" y="2822383"/>
-            <a:ext cx="6088827" cy="1676634"/>
+            <a:off x="205097" y="2075095"/>
+            <a:ext cx="1743318" cy="466790"/>
           </a:xfrm>
           <a:prstGeom prst="rect">
             <a:avLst/>
@@ -26850,10 +27402,10 @@
       </p:pic>
       <p:pic>
         <p:nvPicPr>
-          <p:cNvPr id="5" name="Imagem 4">
+          <p:cNvPr id="13" name="Imagem 12">
             <a:extLst>
               <a:ext uri="{FF2B5EF4-FFF2-40B4-BE49-F238E27FC236}">
-                <a16:creationId xmlns:a16="http://schemas.microsoft.com/office/drawing/2014/main" id="{79EAB5F1-70C2-E980-4088-B325F77F278A}"/>
+                <a16:creationId xmlns:a16="http://schemas.microsoft.com/office/drawing/2014/main" id="{524BAD81-37A2-C137-B6F8-80D0A0689278}"/>
               </a:ext>
             </a:extLst>
           </p:cNvPr>
@@ -26863,112 +27415,25 @@
           <p:nvPr/>
         </p:nvPicPr>
         <p:blipFill>
-          <a:blip r:embed="rId4">
-            <a:extLst>
-              <a:ext uri="{837473B0-CC2E-450A-ABE3-18F120FF3D39}">
-                <a1611:picAttrSrcUrl xmlns:a1611="http://schemas.microsoft.com/office/drawing/2016/11/main" r:id="rId5"/>
-              </a:ext>
-            </a:extLst>
-          </a:blip>
+          <a:blip r:embed="rId4"/>
           <a:stretch>
             <a:fillRect/>
           </a:stretch>
         </p:blipFill>
         <p:spPr>
           <a:xfrm>
-            <a:off x="7696979" y="3187451"/>
-            <a:ext cx="1257132" cy="1257132"/>
+            <a:off x="70809" y="2905236"/>
+            <a:ext cx="9002381" cy="1857634"/>
           </a:xfrm>
           <a:prstGeom prst="rect">
             <a:avLst/>
           </a:prstGeom>
         </p:spPr>
       </p:pic>
-      <p:sp>
-        <p:nvSpPr>
-          <p:cNvPr id="2" name="CaixaDeTexto 1">
-            <a:extLst>
-              <a:ext uri="{FF2B5EF4-FFF2-40B4-BE49-F238E27FC236}">
-                <a16:creationId xmlns:a16="http://schemas.microsoft.com/office/drawing/2014/main" id="{09B4742B-8FC0-A20F-9229-DCDC947032BF}"/>
-              </a:ext>
-            </a:extLst>
-          </p:cNvPr>
-          <p:cNvSpPr txBox="1"/>
-          <p:nvPr/>
-        </p:nvSpPr>
-        <p:spPr>
-          <a:xfrm>
-            <a:off x="983225" y="114772"/>
-            <a:ext cx="5328703" cy="338554"/>
-          </a:xfrm>
-          <a:prstGeom prst="rect">
-            <a:avLst/>
-          </a:prstGeom>
-          <a:noFill/>
-        </p:spPr>
-        <p:txBody>
-          <a:bodyPr wrap="none" rtlCol="0">
-            <a:spAutoFit/>
-          </a:bodyPr>
-          <a:lstStyle/>
-          <a:p>
-            <a:r>
-              <a:rPr lang="pt-BR" sz="1600" dirty="0">
-                <a:solidFill>
-                  <a:schemeClr val="accent3"/>
-                </a:solidFill>
-              </a:rPr>
-              <a:t>--Qual a quantidade de gols por posição por temporada?</a:t>
-            </a:r>
-          </a:p>
-        </p:txBody>
-      </p:sp>
-      <p:sp>
-        <p:nvSpPr>
-          <p:cNvPr id="4" name="CaixaDeTexto 3">
-            <a:extLst>
-              <a:ext uri="{FF2B5EF4-FFF2-40B4-BE49-F238E27FC236}">
-                <a16:creationId xmlns:a16="http://schemas.microsoft.com/office/drawing/2014/main" id="{04BFF77A-9CE7-2372-1763-5795D5D59A4B}"/>
-              </a:ext>
-            </a:extLst>
-          </p:cNvPr>
-          <p:cNvSpPr txBox="1"/>
-          <p:nvPr/>
-        </p:nvSpPr>
-        <p:spPr>
-          <a:xfrm>
-            <a:off x="1527586" y="2539328"/>
-            <a:ext cx="4339650" cy="523220"/>
-          </a:xfrm>
-          <a:prstGeom prst="rect">
-            <a:avLst/>
-          </a:prstGeom>
-          <a:noFill/>
-        </p:spPr>
-        <p:txBody>
-          <a:bodyPr wrap="none" rtlCol="0">
-            <a:spAutoFit/>
-          </a:bodyPr>
-          <a:lstStyle/>
-          <a:p>
-            <a:r>
-              <a:rPr lang="pt-BR" sz="1400" dirty="0">
-                <a:solidFill>
-                  <a:schemeClr val="accent3"/>
-                </a:solidFill>
-              </a:rPr>
-              <a:t>--Qual a quantidade de gols por liga por temporada?</a:t>
-            </a:r>
-          </a:p>
-          <a:p>
-            <a:endParaRPr lang="pt-BR" dirty="0"/>
-          </a:p>
-        </p:txBody>
-      </p:sp>
     </p:spTree>
     <p:extLst>
       <p:ext uri="{BB962C8B-B14F-4D97-AF65-F5344CB8AC3E}">
-        <p14:creationId xmlns:p14="http://schemas.microsoft.com/office/powerpoint/2010/main" val="4273509598"/>
+        <p14:creationId xmlns:p14="http://schemas.microsoft.com/office/powerpoint/2010/main" val="293096372"/>
       </p:ext>
     </p:extLst>
   </p:cSld>
@@ -26978,7 +27443,155 @@
 </p:sld>
 </file>
 
-<file path=ppt/slides/slide11.xml><?xml version="1.0" encoding="utf-8"?>
+<file path=ppt/slides/slide14.xml><?xml version="1.0" encoding="utf-8"?>
+<p:sld xmlns:a="http://schemas.openxmlformats.org/drawingml/2006/main" xmlns:r="http://schemas.openxmlformats.org/officeDocument/2006/relationships" xmlns:p="http://schemas.openxmlformats.org/presentationml/2006/main">
+  <p:cSld>
+    <p:spTree>
+      <p:nvGrpSpPr>
+        <p:cNvPr id="1" name=""/>
+        <p:cNvGrpSpPr/>
+        <p:nvPr/>
+      </p:nvGrpSpPr>
+      <p:grpSpPr>
+        <a:xfrm>
+          <a:off x="0" y="0"/>
+          <a:ext cx="0" cy="0"/>
+          <a:chOff x="0" y="0"/>
+          <a:chExt cx="0" cy="0"/>
+        </a:xfrm>
+      </p:grpSpPr>
+      <p:sp>
+        <p:nvSpPr>
+          <p:cNvPr id="2" name="Título 1">
+            <a:extLst>
+              <a:ext uri="{FF2B5EF4-FFF2-40B4-BE49-F238E27FC236}">
+                <a16:creationId xmlns:a16="http://schemas.microsoft.com/office/drawing/2014/main" id="{E10782E0-6A19-C864-5FA4-A057D207BAF1}"/>
+              </a:ext>
+            </a:extLst>
+          </p:cNvPr>
+          <p:cNvSpPr>
+            <a:spLocks noGrp="1"/>
+          </p:cNvSpPr>
+          <p:nvPr>
+            <p:ph type="ctrTitle"/>
+          </p:nvPr>
+        </p:nvSpPr>
+        <p:spPr>
+          <a:xfrm>
+            <a:off x="-2141100" y="2850939"/>
+            <a:ext cx="6713100" cy="390000"/>
+          </a:xfrm>
+        </p:spPr>
+        <p:txBody>
+          <a:bodyPr/>
+          <a:lstStyle/>
+          <a:p>
+            <a:r>
+              <a:rPr lang="pt-BR" dirty="0"/>
+              <a:t>Verificações</a:t>
+            </a:r>
+          </a:p>
+        </p:txBody>
+      </p:sp>
+      <p:sp>
+        <p:nvSpPr>
+          <p:cNvPr id="3" name="Subtítulo 2">
+            <a:extLst>
+              <a:ext uri="{FF2B5EF4-FFF2-40B4-BE49-F238E27FC236}">
+                <a16:creationId xmlns:a16="http://schemas.microsoft.com/office/drawing/2014/main" id="{C73DA089-1F34-2532-91EC-119F3F106820}"/>
+              </a:ext>
+            </a:extLst>
+          </p:cNvPr>
+          <p:cNvSpPr>
+            <a:spLocks noGrp="1"/>
+          </p:cNvSpPr>
+          <p:nvPr>
+            <p:ph type="subTitle" idx="1"/>
+          </p:nvPr>
+        </p:nvSpPr>
+        <p:spPr/>
+        <p:txBody>
+          <a:bodyPr/>
+          <a:lstStyle/>
+          <a:p>
+            <a:endParaRPr lang="pt-BR"/>
+          </a:p>
+        </p:txBody>
+      </p:sp>
+      <p:sp>
+        <p:nvSpPr>
+          <p:cNvPr id="4" name="Título 3">
+            <a:extLst>
+              <a:ext uri="{FF2B5EF4-FFF2-40B4-BE49-F238E27FC236}">
+                <a16:creationId xmlns:a16="http://schemas.microsoft.com/office/drawing/2014/main" id="{675A7FA0-AE7A-55E5-A652-FE337CC65D01}"/>
+              </a:ext>
+            </a:extLst>
+          </p:cNvPr>
+          <p:cNvSpPr>
+            <a:spLocks noGrp="1"/>
+          </p:cNvSpPr>
+          <p:nvPr>
+            <p:ph type="title" idx="2"/>
+          </p:nvPr>
+        </p:nvSpPr>
+        <p:spPr/>
+        <p:txBody>
+          <a:bodyPr/>
+          <a:lstStyle/>
+          <a:p>
+            <a:endParaRPr lang="pt-BR" dirty="0"/>
+          </a:p>
+        </p:txBody>
+      </p:sp>
+      <p:pic>
+        <p:nvPicPr>
+          <p:cNvPr id="6" name="Imagem 5">
+            <a:extLst>
+              <a:ext uri="{FF2B5EF4-FFF2-40B4-BE49-F238E27FC236}">
+                <a16:creationId xmlns:a16="http://schemas.microsoft.com/office/drawing/2014/main" id="{C4034F5A-1ACE-582F-4E0B-6BA9C72060F9}"/>
+              </a:ext>
+            </a:extLst>
+          </p:cNvPr>
+          <p:cNvPicPr>
+            <a:picLocks noChangeAspect="1"/>
+          </p:cNvPicPr>
+          <p:nvPr/>
+        </p:nvPicPr>
+        <p:blipFill>
+          <a:blip r:embed="rId3">
+            <a:extLst>
+              <a:ext uri="{837473B0-CC2E-450A-ABE3-18F120FF3D39}">
+                <a1611:picAttrSrcUrl xmlns:a1611="http://schemas.microsoft.com/office/drawing/2016/11/main" r:id="rId4"/>
+              </a:ext>
+            </a:extLst>
+          </a:blip>
+          <a:srcRect/>
+          <a:stretch/>
+        </p:blipFill>
+        <p:spPr>
+          <a:xfrm>
+            <a:off x="4769709" y="1618734"/>
+            <a:ext cx="4473146" cy="2854411"/>
+          </a:xfrm>
+          <a:prstGeom prst="rect">
+            <a:avLst/>
+          </a:prstGeom>
+        </p:spPr>
+      </p:pic>
+    </p:spTree>
+    <p:extLst>
+      <p:ext uri="{BB962C8B-B14F-4D97-AF65-F5344CB8AC3E}">
+        <p14:creationId xmlns:p14="http://schemas.microsoft.com/office/powerpoint/2010/main" val="1986738400"/>
+      </p:ext>
+    </p:extLst>
+  </p:cSld>
+  <p:clrMapOvr>
+    <a:masterClrMapping/>
+  </p:clrMapOvr>
+</p:sld>
+</file>
+
+<file path=ppt/slides/slide15.xml><?xml version="1.0" encoding="utf-8"?>
 <p:sld xmlns:a="http://schemas.openxmlformats.org/drawingml/2006/main" xmlns:r="http://schemas.openxmlformats.org/officeDocument/2006/relationships" xmlns:p="http://schemas.openxmlformats.org/presentationml/2006/main">
   <p:cSld>
     <p:spTree>
@@ -27217,7 +27830,7 @@
 </p:sld>
 </file>
 
-<file path=ppt/slides/slide12.xml><?xml version="1.0" encoding="utf-8"?>
+<file path=ppt/slides/slide16.xml><?xml version="1.0" encoding="utf-8"?>
 <p:sld xmlns:a="http://schemas.openxmlformats.org/drawingml/2006/main" xmlns:r="http://schemas.openxmlformats.org/officeDocument/2006/relationships" xmlns:p="http://schemas.openxmlformats.org/presentationml/2006/main">
   <p:cSld>
     <p:spTree>
@@ -27722,12 +28335,20 @@
             <p:ph type="body" idx="1"/>
           </p:nvPr>
         </p:nvSpPr>
-        <p:spPr/>
+        <p:spPr>
+          <a:xfrm>
+            <a:off x="4882332" y="3415471"/>
+            <a:ext cx="3255000" cy="2499900"/>
+          </a:xfrm>
+        </p:spPr>
         <p:txBody>
           <a:bodyPr/>
           <a:lstStyle/>
           <a:p>
-            <a:endParaRPr lang="pt-BR"/>
+            <a:pPr marL="152400" indent="0">
+              <a:buNone/>
+            </a:pPr>
+            <a:endParaRPr lang="pt-BR" dirty="0"/>
           </a:p>
         </p:txBody>
       </p:sp>
@@ -27745,8 +28366,8 @@
         </p:nvSpPr>
         <p:spPr>
           <a:xfrm>
-            <a:off x="434075" y="814550"/>
-            <a:ext cx="8065800" cy="4031873"/>
+            <a:off x="434075" y="879769"/>
+            <a:ext cx="8065800" cy="3785652"/>
           </a:xfrm>
           <a:prstGeom prst="rect">
             <a:avLst/>
@@ -27797,49 +28418,7 @@
                   <a:schemeClr val="accent3"/>
                 </a:solidFill>
               </a:rPr>
-              <a:t>Quais os jogadores com mais gols por posição (Atacante, meia, zagueiro)?</a:t>
-            </a:r>
-          </a:p>
-          <a:p>
-            <a:pPr marL="285750" indent="-285750">
-              <a:buFont typeface="Arial" panose="020B0604020202020204" pitchFamily="34" charset="0"/>
-              <a:buChar char="•"/>
-            </a:pPr>
-            <a:r>
-              <a:rPr lang="pt-BR" sz="1600" dirty="0">
-                <a:solidFill>
-                  <a:schemeClr val="accent3"/>
-                </a:solidFill>
-              </a:rPr>
-              <a:t>Quais os jogadores com mais gols por liga? </a:t>
-            </a:r>
-          </a:p>
-          <a:p>
-            <a:pPr marL="285750" indent="-285750">
-              <a:buFont typeface="Arial" panose="020B0604020202020204" pitchFamily="34" charset="0"/>
-              <a:buChar char="•"/>
-            </a:pPr>
-            <a:r>
-              <a:rPr lang="pt-BR" sz="1600" dirty="0">
-                <a:solidFill>
-                  <a:schemeClr val="accent3"/>
-                </a:solidFill>
-              </a:rPr>
-              <a:t>Quais os jogadores com mais assistências atuando na Europa?</a:t>
-            </a:r>
-          </a:p>
-          <a:p>
-            <a:pPr marL="285750" indent="-285750">
-              <a:buFont typeface="Arial" panose="020B0604020202020204" pitchFamily="34" charset="0"/>
-              <a:buChar char="•"/>
-            </a:pPr>
-            <a:r>
-              <a:rPr lang="pt-BR" sz="1600" dirty="0">
-                <a:solidFill>
-                  <a:schemeClr val="accent3"/>
-                </a:solidFill>
-              </a:rPr>
-              <a:t>Quais posições têm os jogadores com menor valor de mercado?</a:t>
+              <a:t>Qual posição tem os jogadores com menor valor de mercado? </a:t>
             </a:r>
           </a:p>
           <a:p>
@@ -27867,7 +28446,7 @@
                   <a:schemeClr val="accent3"/>
                 </a:solidFill>
               </a:rPr>
-              <a:t>Qual a média do valor de mercado das transferências por temporada por liga?</a:t>
+              <a:t>Qual a média do valor de mercado das transferências por ano?</a:t>
             </a:r>
           </a:p>
           <a:p>
@@ -27909,20 +28488,6 @@
                   <a:schemeClr val="accent3"/>
                 </a:solidFill>
               </a:rPr>
-              <a:t>Qual o número total de gols + assistências por jogador de cada time?</a:t>
-            </a:r>
-          </a:p>
-          <a:p>
-            <a:pPr marL="285750" indent="-285750">
-              <a:buFont typeface="Arial" panose="020B0604020202020204" pitchFamily="34" charset="0"/>
-              <a:buChar char="•"/>
-            </a:pPr>
-            <a:r>
-              <a:rPr lang="pt-BR" sz="1600" dirty="0">
-                <a:solidFill>
-                  <a:schemeClr val="accent3"/>
-                </a:solidFill>
-              </a:rPr>
               <a:t>Quantas transferências de zagueiros ocorreram por temporada?</a:t>
             </a:r>
           </a:p>
@@ -27952,6 +28517,48 @@
                 </a:solidFill>
               </a:rPr>
               <a:t>Quais times brasileiros têm as transferências mais caras por temporada?</a:t>
+            </a:r>
+          </a:p>
+          <a:p>
+            <a:pPr marL="285750" indent="-285750">
+              <a:buFont typeface="Arial" panose="020B0604020202020204" pitchFamily="34" charset="0"/>
+              <a:buChar char="•"/>
+            </a:pPr>
+            <a:r>
+              <a:rPr lang="pt-BR" sz="1600" dirty="0">
+                <a:solidFill>
+                  <a:schemeClr val="accent3"/>
+                </a:solidFill>
+              </a:rPr>
+              <a:t>Qual é o total de transferências por time?</a:t>
+            </a:r>
+          </a:p>
+          <a:p>
+            <a:pPr marL="285750" indent="-285750">
+              <a:buFont typeface="Arial" panose="020B0604020202020204" pitchFamily="34" charset="0"/>
+              <a:buChar char="•"/>
+            </a:pPr>
+            <a:r>
+              <a:rPr lang="pt-BR" sz="1600" dirty="0">
+                <a:solidFill>
+                  <a:schemeClr val="accent3"/>
+                </a:solidFill>
+              </a:rPr>
+              <a:t>Qual liga tem o maior número de transferências?</a:t>
+            </a:r>
+          </a:p>
+          <a:p>
+            <a:pPr marL="285750" indent="-285750">
+              <a:buFont typeface="Arial" panose="020B0604020202020204" pitchFamily="34" charset="0"/>
+              <a:buChar char="•"/>
+            </a:pPr>
+            <a:r>
+              <a:rPr lang="pt-BR" sz="1600" dirty="0">
+                <a:solidFill>
+                  <a:schemeClr val="accent3"/>
+                </a:solidFill>
+              </a:rPr>
+              <a:t>Quais jogadores têm mais transferências sem custos?</a:t>
             </a:r>
           </a:p>
         </p:txBody>
@@ -28750,12 +29357,9 @@
           <p:nvPr/>
         </p:nvPicPr>
         <p:blipFill>
-          <a:blip r:embed="rId3">
-            <a:alphaModFix/>
-          </a:blip>
-          <a:stretch>
-            <a:fillRect/>
-          </a:stretch>
+          <a:blip r:embed="rId3"/>
+          <a:srcRect/>
+          <a:stretch/>
         </p:blipFill>
         <p:spPr>
           <a:xfrm>
@@ -28812,45 +29416,23 @@
             <p:ph type="ctrTitle"/>
           </p:nvPr>
         </p:nvSpPr>
-        <p:spPr/>
+        <p:spPr>
+          <a:xfrm>
+            <a:off x="396990" y="236491"/>
+            <a:ext cx="8065800" cy="390000"/>
+          </a:xfrm>
+        </p:spPr>
         <p:txBody>
           <a:bodyPr/>
           <a:lstStyle/>
           <a:p>
-            <a:endParaRPr lang="pt-BR" dirty="0"/>
+            <a:r>
+              <a:rPr lang="pt-BR" dirty="0"/>
+              <a:t>Criação do banco</a:t>
+            </a:r>
           </a:p>
         </p:txBody>
       </p:sp>
-      <p:pic>
-        <p:nvPicPr>
-          <p:cNvPr id="4" name="Imagem 3">
-            <a:extLst>
-              <a:ext uri="{FF2B5EF4-FFF2-40B4-BE49-F238E27FC236}">
-                <a16:creationId xmlns:a16="http://schemas.microsoft.com/office/drawing/2014/main" id="{1B07A607-2415-EDBF-5F3B-70082A736542}"/>
-              </a:ext>
-            </a:extLst>
-          </p:cNvPr>
-          <p:cNvPicPr>
-            <a:picLocks noChangeAspect="1"/>
-          </p:cNvPicPr>
-          <p:nvPr/>
-        </p:nvPicPr>
-        <p:blipFill>
-          <a:blip r:embed="rId2"/>
-          <a:stretch>
-            <a:fillRect/>
-          </a:stretch>
-        </p:blipFill>
-        <p:spPr>
-          <a:xfrm>
-            <a:off x="2738181" y="395010"/>
-            <a:ext cx="3667637" cy="3972479"/>
-          </a:xfrm>
-          <a:prstGeom prst="rect">
-            <a:avLst/>
-          </a:prstGeom>
-        </p:spPr>
-      </p:pic>
       <p:pic>
         <p:nvPicPr>
           <p:cNvPr id="3" name="Imagem 2">
@@ -28866,10 +29448,10 @@
           <p:nvPr/>
         </p:nvPicPr>
         <p:blipFill>
-          <a:blip r:embed="rId3">
+          <a:blip r:embed="rId2">
             <a:extLst>
               <a:ext uri="{837473B0-CC2E-450A-ABE3-18F120FF3D39}">
-                <a1611:picAttrSrcUrl xmlns:a1611="http://schemas.microsoft.com/office/drawing/2016/11/main" r:id="rId4"/>
+                <a1611:picAttrSrcUrl xmlns:a1611="http://schemas.microsoft.com/office/drawing/2016/11/main" r:id="rId3"/>
               </a:ext>
             </a:extLst>
           </a:blip>
@@ -28881,6 +29463,96 @@
           <a:xfrm>
             <a:off x="6620128" y="2342124"/>
             <a:ext cx="2363234" cy="2025365"/>
+          </a:xfrm>
+          <a:prstGeom prst="rect">
+            <a:avLst/>
+          </a:prstGeom>
+        </p:spPr>
+      </p:pic>
+      <p:pic>
+        <p:nvPicPr>
+          <p:cNvPr id="5" name="Imagem 4">
+            <a:extLst>
+              <a:ext uri="{FF2B5EF4-FFF2-40B4-BE49-F238E27FC236}">
+                <a16:creationId xmlns:a16="http://schemas.microsoft.com/office/drawing/2014/main" id="{46A55173-73C6-330B-04CE-2256F291ED12}"/>
+              </a:ext>
+            </a:extLst>
+          </p:cNvPr>
+          <p:cNvPicPr>
+            <a:picLocks noChangeAspect="1"/>
+          </p:cNvPicPr>
+          <p:nvPr/>
+        </p:nvPicPr>
+        <p:blipFill>
+          <a:blip r:embed="rId4"/>
+          <a:stretch>
+            <a:fillRect/>
+          </a:stretch>
+        </p:blipFill>
+        <p:spPr>
+          <a:xfrm>
+            <a:off x="427992" y="626491"/>
+            <a:ext cx="3482385" cy="2025364"/>
+          </a:xfrm>
+          <a:prstGeom prst="rect">
+            <a:avLst/>
+          </a:prstGeom>
+        </p:spPr>
+      </p:pic>
+      <p:pic>
+        <p:nvPicPr>
+          <p:cNvPr id="8" name="Imagem 7">
+            <a:extLst>
+              <a:ext uri="{FF2B5EF4-FFF2-40B4-BE49-F238E27FC236}">
+                <a16:creationId xmlns:a16="http://schemas.microsoft.com/office/drawing/2014/main" id="{02FF6C06-C3E4-0C6A-965E-DB27B415DA0B}"/>
+              </a:ext>
+            </a:extLst>
+          </p:cNvPr>
+          <p:cNvPicPr>
+            <a:picLocks noChangeAspect="1"/>
+          </p:cNvPicPr>
+          <p:nvPr/>
+        </p:nvPicPr>
+        <p:blipFill>
+          <a:blip r:embed="rId5"/>
+          <a:stretch>
+            <a:fillRect/>
+          </a:stretch>
+        </p:blipFill>
+        <p:spPr>
+          <a:xfrm>
+            <a:off x="2161387" y="2396190"/>
+            <a:ext cx="3757499" cy="2054882"/>
+          </a:xfrm>
+          <a:prstGeom prst="rect">
+            <a:avLst/>
+          </a:prstGeom>
+        </p:spPr>
+      </p:pic>
+      <p:pic>
+        <p:nvPicPr>
+          <p:cNvPr id="10" name="Imagem 9">
+            <a:extLst>
+              <a:ext uri="{FF2B5EF4-FFF2-40B4-BE49-F238E27FC236}">
+                <a16:creationId xmlns:a16="http://schemas.microsoft.com/office/drawing/2014/main" id="{229B2EE4-EC3A-85D2-4ABB-5A39DAD0762F}"/>
+              </a:ext>
+            </a:extLst>
+          </p:cNvPr>
+          <p:cNvPicPr>
+            <a:picLocks noChangeAspect="1"/>
+          </p:cNvPicPr>
+          <p:nvPr/>
+        </p:nvPicPr>
+        <p:blipFill>
+          <a:blip r:embed="rId6"/>
+          <a:stretch>
+            <a:fillRect/>
+          </a:stretch>
+        </p:blipFill>
+        <p:spPr>
+          <a:xfrm>
+            <a:off x="5233624" y="124877"/>
+            <a:ext cx="3482384" cy="2140642"/>
           </a:xfrm>
           <a:prstGeom prst="rect">
             <a:avLst/>
@@ -28933,12 +29605,20 @@
             <p:ph type="ctrTitle"/>
           </p:nvPr>
         </p:nvSpPr>
-        <p:spPr/>
+        <p:spPr>
+          <a:xfrm>
+            <a:off x="189886" y="424550"/>
+            <a:ext cx="8065800" cy="390000"/>
+          </a:xfrm>
+        </p:spPr>
         <p:txBody>
           <a:bodyPr/>
           <a:lstStyle/>
           <a:p>
-            <a:endParaRPr lang="pt-BR"/>
+            <a:r>
+              <a:rPr lang="pt-BR" dirty="0"/>
+              <a:t>Povoamento</a:t>
+            </a:r>
           </a:p>
         </p:txBody>
       </p:sp>
@@ -29234,13 +29914,12 @@
         </p:nvPicPr>
         <p:blipFill>
           <a:blip r:embed="rId2"/>
-          <a:stretch>
-            <a:fillRect/>
-          </a:stretch>
+          <a:srcRect/>
+          <a:stretch/>
         </p:blipFill>
         <p:spPr>
           <a:xfrm>
-            <a:off x="0" y="0"/>
+            <a:off x="0" y="12357"/>
             <a:ext cx="9144000" cy="5143500"/>
           </a:xfrm>
           <a:prstGeom prst="rect">

</xml_diff>

<commit_message>
Alteração final no pitch.
</commit_message>
<xml_diff>
--- a/Pitch_do_Projeto.pptx
+++ b/Pitch_do_Projeto.pptx
@@ -33,7 +33,7 @@
       <p:regular r:id="rId19"/>
     </p:embeddedFont>
     <p:embeddedFont>
-      <p:font typeface="Squada One" panose="020B0604020202020204" charset="0"/>
+      <p:font typeface="Squada One"/>
       <p:regular r:id="rId20"/>
     </p:embeddedFont>
   </p:embeddedFontLst>
@@ -27660,8 +27660,8 @@
         </p:blipFill>
         <p:spPr>
           <a:xfrm>
-            <a:off x="814123" y="624027"/>
-            <a:ext cx="7515753" cy="1777021"/>
+            <a:off x="814123" y="620842"/>
+            <a:ext cx="7515753" cy="1043855"/>
           </a:xfrm>
           <a:prstGeom prst="rect">
             <a:avLst/>
@@ -27689,8 +27689,8 @@
         </p:blipFill>
         <p:spPr>
           <a:xfrm>
-            <a:off x="1547318" y="3098657"/>
-            <a:ext cx="6049361" cy="1015218"/>
+            <a:off x="967167" y="2373974"/>
+            <a:ext cx="4690791" cy="1257132"/>
           </a:xfrm>
           <a:prstGeom prst="rect">
             <a:avLst/>
@@ -27748,7 +27748,7 @@
         <p:spPr>
           <a:xfrm>
             <a:off x="814123" y="357940"/>
-            <a:ext cx="7572907" cy="523220"/>
+            <a:ext cx="3935693" cy="523220"/>
           </a:xfrm>
           <a:prstGeom prst="rect">
             <a:avLst/>
@@ -27767,7 +27767,23 @@
                   <a:schemeClr val="accent3"/>
                 </a:solidFill>
               </a:rPr>
-              <a:t>--Qual o total de transferências que superam o valor de mercado da liga mais desvalorizada?</a:t>
+              <a:t>--Qual </a:t>
+            </a:r>
+            <a:r>
+              <a:rPr lang="pt-BR" dirty="0">
+                <a:solidFill>
+                  <a:schemeClr val="accent3"/>
+                </a:solidFill>
+              </a:rPr>
+              <a:t>país possui os jogadores mais valiosos</a:t>
+            </a:r>
+            <a:r>
+              <a:rPr lang="pt-BR" sz="1400" dirty="0">
+                <a:solidFill>
+                  <a:schemeClr val="accent3"/>
+                </a:solidFill>
+              </a:rPr>
+              <a:t>?</a:t>
             </a:r>
           </a:p>
           <a:p>
@@ -27789,8 +27805,8 @@
         </p:nvSpPr>
         <p:spPr>
           <a:xfrm>
-            <a:off x="1547318" y="2837047"/>
-            <a:ext cx="4996881" cy="523220"/>
+            <a:off x="814123" y="2048530"/>
+            <a:ext cx="4610558" cy="523220"/>
           </a:xfrm>
           <a:prstGeom prst="rect">
             <a:avLst/>
@@ -27809,7 +27825,23 @@
                   <a:schemeClr val="accent3"/>
                 </a:solidFill>
               </a:rPr>
-              <a:t>--Quais países tem os jogadores mais caros por temporada?</a:t>
+              <a:t>--Quais </a:t>
+            </a:r>
+            <a:r>
+              <a:rPr lang="pt-BR" dirty="0">
+                <a:solidFill>
+                  <a:schemeClr val="accent3"/>
+                </a:solidFill>
+              </a:rPr>
+              <a:t>jogadores têm mais transferências sem custos</a:t>
+            </a:r>
+            <a:r>
+              <a:rPr lang="pt-BR" sz="1400" dirty="0">
+                <a:solidFill>
+                  <a:schemeClr val="accent3"/>
+                </a:solidFill>
+              </a:rPr>
+              <a:t>?</a:t>
             </a:r>
           </a:p>
           <a:p>

</xml_diff>